<commit_message>
Added pdf for Common Sense Media report and aligned headers to be .3 from top
</commit_message>
<xml_diff>
--- a/Resources/Fusion_all_icons_pptx.pptx
+++ b/Resources/Fusion_all_icons_pptx.pptx
@@ -5,10 +5,11 @@
     <p:sldMasterId id="2147493455" r:id="rId4"/>
   </p:sldMasterIdLst>
   <p:notesMasterIdLst>
-    <p:notesMasterId r:id="rId6"/>
+    <p:notesMasterId r:id="rId7"/>
   </p:notesMasterIdLst>
   <p:sldIdLst>
     <p:sldId id="328" r:id="rId5"/>
+    <p:sldId id="329" r:id="rId6"/>
   </p:sldIdLst>
   <p:sldSz cx="9144000" cy="5143500" type="screen16x9"/>
   <p:notesSz cx="6858000" cy="9144000"/>
@@ -107,6 +108,22 @@
       </a:defRPr>
     </a:lvl9pPr>
   </p:defaultTextStyle>
+  <p:extLst>
+    <p:ext uri="{EFAFB233-063F-42B5-8137-9DF3F51BA10A}">
+      <p15:sldGuideLst xmlns:p15="http://schemas.microsoft.com/office/powerpoint/2012/main">
+        <p15:guide id="1" orient="horz" pos="3239">
+          <p15:clr>
+            <a:srgbClr val="A4A3A4"/>
+          </p15:clr>
+        </p15:guide>
+        <p15:guide id="2" pos="5759">
+          <p15:clr>
+            <a:srgbClr val="A4A3A4"/>
+          </p15:clr>
+        </p15:guide>
+      </p15:sldGuideLst>
+    </p:ext>
+  </p:extLst>
 </p:presentation>
 </file>
 
@@ -192,7 +209,7 @@
           <a:p>
             <a:fld id="{BDCC8E7D-946F-2A4B-9209-2B2FFA2898B7}" type="datetimeFigureOut">
               <a:rPr lang="en-US" smtClean="0"/>
-              <a:t>01/03/15</a:t>
+              <a:t>4/24/2015</a:t>
             </a:fld>
             <a:endParaRPr lang="en-US"/>
           </a:p>
@@ -660,7 +677,7 @@
   <p:timing>
     <p:tnLst>
       <p:par>
-        <p:cTn xmlns:p14="http://schemas.microsoft.com/office/powerpoint/2010/main" id="1" dur="indefinite" restart="never" nodeType="tmRoot"/>
+        <p:cTn id="1" dur="indefinite" restart="never" nodeType="tmRoot"/>
       </p:par>
     </p:tnLst>
   </p:timing>
@@ -4604,7 +4621,7 @@
   <p:timing>
     <p:tnLst>
       <p:par>
-        <p:cTn xmlns:p14="http://schemas.microsoft.com/office/powerpoint/2010/main" id="1" dur="indefinite" restart="never" nodeType="tmRoot"/>
+        <p:cTn id="1" dur="indefinite" restart="never" nodeType="tmRoot"/>
       </p:par>
     </p:tnLst>
   </p:timing>
@@ -4867,7 +4884,7 @@
   <p:timing>
     <p:tnLst>
       <p:par>
-        <p:cTn xmlns:p14="http://schemas.microsoft.com/office/powerpoint/2010/main" id="1" dur="indefinite" restart="never" nodeType="tmRoot"/>
+        <p:cTn id="1" dur="indefinite" restart="never" nodeType="tmRoot"/>
       </p:par>
     </p:tnLst>
   </p:timing>
@@ -6080,7 +6097,7 @@
   <p:timing>
     <p:tnLst>
       <p:par>
-        <p:cTn xmlns:p14="http://schemas.microsoft.com/office/powerpoint/2010/main" id="1" dur="indefinite" restart="never" nodeType="tmRoot"/>
+        <p:cTn id="1" dur="indefinite" restart="never" nodeType="tmRoot"/>
       </p:par>
     </p:tnLst>
   </p:timing>
@@ -8237,7 +8254,7 @@
   <p:timing>
     <p:tnLst>
       <p:par>
-        <p:cTn xmlns:p14="http://schemas.microsoft.com/office/powerpoint/2010/main" id="1" dur="indefinite" restart="never" nodeType="tmRoot"/>
+        <p:cTn id="1" dur="indefinite" restart="never" nodeType="tmRoot"/>
       </p:par>
     </p:tnLst>
   </p:timing>
@@ -8530,7 +8547,7 @@
           </a:ln>
           <a:extLst>
             <a:ext uri="{C572A759-6A51-4108-AA02-DFA0A04FC94B}">
-              <ma14:wrappingTextBoxFlag xmlns:ma14="http://schemas.microsoft.com/office/mac/drawingml/2011/main" val="1"/>
+              <ma14:wrappingTextBoxFlag xmlns:ma14="http://schemas.microsoft.com/office/mac/drawingml/2011/main" xmlns="" val="1"/>
             </a:ext>
           </a:extLst>
         </p:spPr>
@@ -8586,10 +8603,135 @@
   <p:timing>
     <p:tnLst>
       <p:par>
-        <p:cTn xmlns:p14="http://schemas.microsoft.com/office/powerpoint/2010/main" id="1" dur="indefinite" restart="never" nodeType="tmRoot"/>
+        <p:cTn id="1" dur="indefinite" restart="never" nodeType="tmRoot"/>
       </p:par>
     </p:tnLst>
   </p:timing>
+</p:sld>
+</file>
+
+<file path=ppt/slides/slide2.xml><?xml version="1.0" encoding="utf-8"?>
+<p:sld xmlns:a="http://schemas.openxmlformats.org/drawingml/2006/main" xmlns:r="http://schemas.openxmlformats.org/officeDocument/2006/relationships" xmlns:p="http://schemas.openxmlformats.org/presentationml/2006/main">
+  <p:cSld>
+    <p:spTree>
+      <p:nvGrpSpPr>
+        <p:cNvPr id="1" name=""/>
+        <p:cNvGrpSpPr/>
+        <p:nvPr/>
+      </p:nvGrpSpPr>
+      <p:grpSpPr>
+        <a:xfrm>
+          <a:off x="0" y="0"/>
+          <a:ext cx="0" cy="0"/>
+          <a:chOff x="0" y="0"/>
+          <a:chExt cx="0" cy="0"/>
+        </a:xfrm>
+      </p:grpSpPr>
+      <p:sp>
+        <p:nvSpPr>
+          <p:cNvPr id="2" name="TextBox 1"/>
+          <p:cNvSpPr txBox="1"/>
+          <p:nvPr/>
+        </p:nvSpPr>
+        <p:spPr>
+          <a:xfrm>
+            <a:off x="921380" y="432769"/>
+            <a:ext cx="7671188" cy="2701124"/>
+          </a:xfrm>
+          <a:prstGeom prst="rect">
+            <a:avLst/>
+          </a:prstGeom>
+          <a:noFill/>
+        </p:spPr>
+        <p:txBody>
+          <a:bodyPr wrap="square" rtlCol="0">
+            <a:spAutoFit/>
+          </a:bodyPr>
+          <a:lstStyle/>
+          <a:p>
+            <a:pPr>
+              <a:lnSpc>
+                <a:spcPct val="107000"/>
+              </a:lnSpc>
+              <a:spcAft>
+                <a:spcPts val="800"/>
+              </a:spcAft>
+            </a:pPr>
+            <a:r>
+              <a:rPr lang="en-US" sz="3200" dirty="0">
+                <a:latin typeface="baby icons" panose="02000500000000000000" pitchFamily="2" charset="0"/>
+                <a:ea typeface="Calibri" panose="020F0502020204030204" pitchFamily="34" charset="0"/>
+                <a:cs typeface="Times New Roman" panose="02020603050405020304" pitchFamily="18" charset="0"/>
+              </a:rPr>
+              <a:t>1234567890-=</a:t>
+            </a:r>
+            <a:r>
+              <a:rPr lang="en-US" sz="3200" dirty="0" err="1">
+                <a:latin typeface="baby icons" panose="02000500000000000000" pitchFamily="2" charset="0"/>
+                <a:ea typeface="Calibri" panose="020F0502020204030204" pitchFamily="34" charset="0"/>
+                <a:cs typeface="Times New Roman" panose="02020603050405020304" pitchFamily="18" charset="0"/>
+              </a:rPr>
+              <a:t>qwertyuiop</a:t>
+            </a:r>
+            <a:r>
+              <a:rPr lang="en-US" sz="3200" dirty="0">
+                <a:latin typeface="baby icons" panose="02000500000000000000" pitchFamily="2" charset="0"/>
+                <a:ea typeface="Calibri" panose="020F0502020204030204" pitchFamily="34" charset="0"/>
+                <a:cs typeface="Times New Roman" panose="02020603050405020304" pitchFamily="18" charset="0"/>
+              </a:rPr>
+              <a:t>[]\</a:t>
+            </a:r>
+            <a:r>
+              <a:rPr lang="en-US" sz="3200" dirty="0" err="1">
+                <a:latin typeface="baby icons" panose="02000500000000000000" pitchFamily="2" charset="0"/>
+                <a:ea typeface="Calibri" panose="020F0502020204030204" pitchFamily="34" charset="0"/>
+                <a:cs typeface="Times New Roman" panose="02020603050405020304" pitchFamily="18" charset="0"/>
+              </a:rPr>
+              <a:t>asdfghjkl</a:t>
+            </a:r>
+            <a:r>
+              <a:rPr lang="en-US" sz="3200" dirty="0">
+                <a:latin typeface="baby icons" panose="02000500000000000000" pitchFamily="2" charset="0"/>
+                <a:ea typeface="Calibri" panose="020F0502020204030204" pitchFamily="34" charset="0"/>
+                <a:cs typeface="Times New Roman" panose="02020603050405020304" pitchFamily="18" charset="0"/>
+              </a:rPr>
+              <a:t>;’</a:t>
+            </a:r>
+            <a:r>
+              <a:rPr lang="en-US" sz="3200" dirty="0" err="1">
+                <a:latin typeface="baby icons" panose="02000500000000000000" pitchFamily="2" charset="0"/>
+                <a:ea typeface="Calibri" panose="020F0502020204030204" pitchFamily="34" charset="0"/>
+                <a:cs typeface="Times New Roman" panose="02020603050405020304" pitchFamily="18" charset="0"/>
+              </a:rPr>
+              <a:t>zxcvbnm</a:t>
+            </a:r>
+            <a:r>
+              <a:rPr lang="en-US" sz="3200" dirty="0">
+                <a:latin typeface="baby icons" panose="02000500000000000000" pitchFamily="2" charset="0"/>
+                <a:ea typeface="Calibri" panose="020F0502020204030204" pitchFamily="34" charset="0"/>
+                <a:cs typeface="Times New Roman" panose="02020603050405020304" pitchFamily="18" charset="0"/>
+              </a:rPr>
+              <a:t>,./`~&lt;&gt;?:”{}|+_)(*&amp;^%$#@!QWERTYUIOPASDFGHJKLZXCVBNM</a:t>
+            </a:r>
+            <a:endParaRPr lang="en-US" sz="1200" dirty="0">
+              <a:effectLst/>
+              <a:latin typeface="Calibri" panose="020F0502020204030204" pitchFamily="34" charset="0"/>
+              <a:ea typeface="Calibri" panose="020F0502020204030204" pitchFamily="34" charset="0"/>
+              <a:cs typeface="Times New Roman" panose="02020603050405020304" pitchFamily="18" charset="0"/>
+            </a:endParaRPr>
+          </a:p>
+        </p:txBody>
+      </p:sp>
+    </p:spTree>
+    <p:extLst>
+      <p:ext uri="{BB962C8B-B14F-4D97-AF65-F5344CB8AC3E}">
+        <p14:creationId xmlns:p14="http://schemas.microsoft.com/office/powerpoint/2010/main" val="2020402970"/>
+      </p:ext>
+    </p:extLst>
+  </p:cSld>
+  <p:clrMapOvr>
+    <a:masterClrMapping/>
+  </p:clrMapOvr>
 </p:sld>
 </file>
 
@@ -9243,6 +9385,15 @@
 </file>
 
 <file path=customXml/item2.xml><?xml version="1.0" encoding="utf-8"?>
+<?mso-contentType ?>
+<FormTemplates xmlns="http://schemas.microsoft.com/sharepoint/v3/contenttype/forms">
+  <Display>DocumentLibraryForm</Display>
+  <Edit>DocumentLibraryForm</Edit>
+  <New>DocumentLibraryForm</New>
+</FormTemplates>
+</file>
+
+<file path=customXml/item3.xml><?xml version="1.0" encoding="utf-8"?>
 <ct:contentTypeSchema xmlns:ct="http://schemas.microsoft.com/office/2006/metadata/contentType" xmlns:ma="http://schemas.microsoft.com/office/2006/metadata/properties/metaAttributes" ct:_="" ma:_="" ma:contentTypeName="Document" ma:contentTypeID="0x0101000DE64AEEDD9B7A4D93545ACBE97D4615" ma:contentTypeVersion="2" ma:contentTypeDescription="Create a new document." ma:contentTypeScope="" ma:versionID="f49002b78e3a4a71b814eef46a983816">
   <xsd:schema xmlns:xsd="http://www.w3.org/2001/XMLSchema" xmlns:xs="http://www.w3.org/2001/XMLSchema" xmlns:p="http://schemas.microsoft.com/office/2006/metadata/properties" xmlns:ns2="http://schemas.microsoft.com/sharepoint/v3/fields" targetNamespace="http://schemas.microsoft.com/office/2006/metadata/properties" ma:root="true" ma:fieldsID="38f6db2dd0d9a0cf6a8dc37be32b365b" ns2:_="">
     <xsd:import namespace="http://schemas.microsoft.com/sharepoint/v3/fields"/>
@@ -9386,15 +9537,6 @@
 </ct:contentTypeSchema>
 </file>
 
-<file path=customXml/item3.xml><?xml version="1.0" encoding="utf-8"?>
-<?mso-contentType ?>
-<FormTemplates xmlns="http://schemas.microsoft.com/sharepoint/v3/contenttype/forms">
-  <Display>DocumentLibraryForm</Display>
-  <Edit>DocumentLibraryForm</Edit>
-  <New>DocumentLibraryForm</New>
-</FormTemplates>
-</file>
-
 <file path=customXml/itemProps1.xml><?xml version="1.0" encoding="utf-8"?>
 <ds:datastoreItem xmlns:ds="http://schemas.openxmlformats.org/officeDocument/2006/customXml" ds:itemID="{7B6F2769-7194-4217-93D3-3AF3A4742282}">
   <ds:schemaRefs>
@@ -9406,6 +9548,14 @@
 </file>
 
 <file path=customXml/itemProps2.xml><?xml version="1.0" encoding="utf-8"?>
+<ds:datastoreItem xmlns:ds="http://schemas.openxmlformats.org/officeDocument/2006/customXml" ds:itemID="{87D2A1B0-FF3E-4009-940D-AED0EB70AA20}">
+  <ds:schemaRefs>
+    <ds:schemaRef ds:uri="http://schemas.microsoft.com/sharepoint/v3/contenttype/forms"/>
+  </ds:schemaRefs>
+</ds:datastoreItem>
+</file>
+
+<file path=customXml/itemProps3.xml><?xml version="1.0" encoding="utf-8"?>
 <ds:datastoreItem xmlns:ds="http://schemas.openxmlformats.org/officeDocument/2006/customXml" ds:itemID="{E4214858-785C-42F7-BE66-6D0E79395FC8}">
   <ds:schemaRefs>
     <ds:schemaRef ds:uri="http://schemas.microsoft.com/office/2006/metadata/contentType"/>
@@ -9421,12 +9571,4 @@
     <ds:schemaRef ds:uri="http://schemas.microsoft.com/internal/obd"/>
   </ds:schemaRefs>
 </ds:datastoreItem>
-</file>
-
-<file path=customXml/itemProps3.xml><?xml version="1.0" encoding="utf-8"?>
-<ds:datastoreItem xmlns:ds="http://schemas.openxmlformats.org/officeDocument/2006/customXml" ds:itemID="{87D2A1B0-FF3E-4009-940D-AED0EB70AA20}">
-  <ds:schemaRefs>
-    <ds:schemaRef ds:uri="http://schemas.microsoft.com/sharepoint/v3/contenttype/forms"/>
-  </ds:schemaRefs>
-</ds:datastoreItem>
 </file>
</xml_diff>